<commit_message>
Finished the spinup and spindown subsubsection, about to write the AFP loss subsection.
</commit_message>
<xml_diff>
--- a/EffectiveField.pptx
+++ b/EffectiveField.pptx
@@ -288,7 +288,7 @@
           <a:p>
             <a:fld id="{64796449-2767-4C4F-B318-75F84B20A392}" type="datetimeFigureOut">
               <a:rPr lang="en-US" smtClean="0"/>
-              <a:t>5/12/16</a:t>
+              <a:t>5/13/16</a:t>
             </a:fld>
             <a:endParaRPr lang="en-US"/>
           </a:p>
@@ -458,7 +458,7 @@
           <a:p>
             <a:fld id="{64796449-2767-4C4F-B318-75F84B20A392}" type="datetimeFigureOut">
               <a:rPr lang="en-US" smtClean="0"/>
-              <a:t>5/12/16</a:t>
+              <a:t>5/13/16</a:t>
             </a:fld>
             <a:endParaRPr lang="en-US"/>
           </a:p>
@@ -638,7 +638,7 @@
           <a:p>
             <a:fld id="{64796449-2767-4C4F-B318-75F84B20A392}" type="datetimeFigureOut">
               <a:rPr lang="en-US" smtClean="0"/>
-              <a:t>5/12/16</a:t>
+              <a:t>5/13/16</a:t>
             </a:fld>
             <a:endParaRPr lang="en-US"/>
           </a:p>
@@ -808,7 +808,7 @@
           <a:p>
             <a:fld id="{64796449-2767-4C4F-B318-75F84B20A392}" type="datetimeFigureOut">
               <a:rPr lang="en-US" smtClean="0"/>
-              <a:t>5/12/16</a:t>
+              <a:t>5/13/16</a:t>
             </a:fld>
             <a:endParaRPr lang="en-US"/>
           </a:p>
@@ -1054,7 +1054,7 @@
           <a:p>
             <a:fld id="{64796449-2767-4C4F-B318-75F84B20A392}" type="datetimeFigureOut">
               <a:rPr lang="en-US" smtClean="0"/>
-              <a:t>5/12/16</a:t>
+              <a:t>5/13/16</a:t>
             </a:fld>
             <a:endParaRPr lang="en-US"/>
           </a:p>
@@ -1342,7 +1342,7 @@
           <a:p>
             <a:fld id="{64796449-2767-4C4F-B318-75F84B20A392}" type="datetimeFigureOut">
               <a:rPr lang="en-US" smtClean="0"/>
-              <a:t>5/12/16</a:t>
+              <a:t>5/13/16</a:t>
             </a:fld>
             <a:endParaRPr lang="en-US"/>
           </a:p>
@@ -1764,7 +1764,7 @@
           <a:p>
             <a:fld id="{64796449-2767-4C4F-B318-75F84B20A392}" type="datetimeFigureOut">
               <a:rPr lang="en-US" smtClean="0"/>
-              <a:t>5/12/16</a:t>
+              <a:t>5/13/16</a:t>
             </a:fld>
             <a:endParaRPr lang="en-US"/>
           </a:p>
@@ -1882,7 +1882,7 @@
           <a:p>
             <a:fld id="{64796449-2767-4C4F-B318-75F84B20A392}" type="datetimeFigureOut">
               <a:rPr lang="en-US" smtClean="0"/>
-              <a:t>5/12/16</a:t>
+              <a:t>5/13/16</a:t>
             </a:fld>
             <a:endParaRPr lang="en-US"/>
           </a:p>
@@ -1977,7 +1977,7 @@
           <a:p>
             <a:fld id="{64796449-2767-4C4F-B318-75F84B20A392}" type="datetimeFigureOut">
               <a:rPr lang="en-US" smtClean="0"/>
-              <a:t>5/12/16</a:t>
+              <a:t>5/13/16</a:t>
             </a:fld>
             <a:endParaRPr lang="en-US"/>
           </a:p>
@@ -2254,7 +2254,7 @@
           <a:p>
             <a:fld id="{64796449-2767-4C4F-B318-75F84B20A392}" type="datetimeFigureOut">
               <a:rPr lang="en-US" smtClean="0"/>
-              <a:t>5/12/16</a:t>
+              <a:t>5/13/16</a:t>
             </a:fld>
             <a:endParaRPr lang="en-US"/>
           </a:p>
@@ -2507,7 +2507,7 @@
           <a:p>
             <a:fld id="{64796449-2767-4C4F-B318-75F84B20A392}" type="datetimeFigureOut">
               <a:rPr lang="en-US" smtClean="0"/>
-              <a:t>5/12/16</a:t>
+              <a:t>5/13/16</a:t>
             </a:fld>
             <a:endParaRPr lang="en-US"/>
           </a:p>
@@ -2720,7 +2720,7 @@
           <a:p>
             <a:fld id="{64796449-2767-4C4F-B318-75F84B20A392}" type="datetimeFigureOut">
               <a:rPr lang="en-US" smtClean="0"/>
-              <a:t>5/12/16</a:t>
+              <a:t>5/13/16</a:t>
             </a:fld>
             <a:endParaRPr lang="en-US"/>
           </a:p>
@@ -3103,7 +3103,7 @@
         </p:nvCxnSpPr>
         <p:spPr>
           <a:xfrm flipH="1" flipV="1">
-            <a:off x="3214455" y="2288756"/>
+            <a:off x="6111431" y="1634131"/>
             <a:ext cx="2" cy="3228074"/>
           </a:xfrm>
           <a:prstGeom prst="straightConnector1">
@@ -3139,8 +3139,8 @@
         </p:nvCxnSpPr>
         <p:spPr>
           <a:xfrm>
-            <a:off x="3214456" y="5516829"/>
-            <a:ext cx="1904861" cy="0"/>
+            <a:off x="6111434" y="4862202"/>
+            <a:ext cx="661410" cy="1"/>
           </a:xfrm>
           <a:prstGeom prst="straightConnector1">
             <a:avLst/>
@@ -3175,8 +3175,8 @@
         </p:nvCxnSpPr>
         <p:spPr>
           <a:xfrm flipV="1">
-            <a:off x="3214455" y="4233537"/>
-            <a:ext cx="1904862" cy="1283293"/>
+            <a:off x="6111433" y="3327544"/>
+            <a:ext cx="661411" cy="1534661"/>
           </a:xfrm>
           <a:prstGeom prst="straightConnector1">
             <a:avLst/>
@@ -3211,8 +3211,8 @@
         </p:nvCxnSpPr>
         <p:spPr>
           <a:xfrm flipH="1">
-            <a:off x="3214458" y="4286456"/>
-            <a:ext cx="1904859" cy="0"/>
+            <a:off x="6111437" y="3340773"/>
+            <a:ext cx="661407" cy="0"/>
           </a:xfrm>
           <a:prstGeom prst="line">
             <a:avLst/>
@@ -3244,8 +3244,8 @@
         </p:nvCxnSpPr>
         <p:spPr>
           <a:xfrm>
-            <a:off x="5119317" y="4233537"/>
-            <a:ext cx="0" cy="1283292"/>
+            <a:off x="6772844" y="3340773"/>
+            <a:ext cx="0" cy="1521429"/>
           </a:xfrm>
           <a:prstGeom prst="line">
             <a:avLst/>
@@ -3280,7 +3280,7 @@
         </p:nvSpPr>
         <p:spPr>
           <a:xfrm>
-            <a:off x="2764694" y="3201613"/>
+            <a:off x="5780724" y="2546986"/>
             <a:ext cx="410075" cy="369332"/>
           </a:xfrm>
           <a:prstGeom prst="rect">
@@ -3310,7 +3310,7 @@
         </p:nvSpPr>
         <p:spPr>
           <a:xfrm>
-            <a:off x="3505477" y="3016395"/>
+            <a:off x="6336313" y="2320977"/>
             <a:ext cx="291020" cy="515962"/>
           </a:xfrm>
           <a:prstGeom prst="curvedLeftArrow">
@@ -3352,7 +3352,7 @@
         </p:nvSpPr>
         <p:spPr>
           <a:xfrm>
-            <a:off x="3875866" y="3016947"/>
+            <a:off x="6660404" y="2320977"/>
             <a:ext cx="224879" cy="369332"/>
           </a:xfrm>
           <a:prstGeom prst="rect">
@@ -3382,7 +3382,7 @@
         </p:nvSpPr>
         <p:spPr>
           <a:xfrm>
-            <a:off x="4219799" y="4790292"/>
+            <a:off x="6375997" y="4121336"/>
             <a:ext cx="793693" cy="369332"/>
           </a:xfrm>
           <a:prstGeom prst="rect">
@@ -3405,6 +3405,997 @@
               <a:t>eff</a:t>
             </a:r>
             <a:endParaRPr lang="en-US" baseline="-25000" dirty="0"/>
+          </a:p>
+        </p:txBody>
+      </p:sp>
+      <p:cxnSp>
+        <p:nvCxnSpPr>
+          <p:cNvPr id="11" name="Straight Arrow Connector 10"/>
+          <p:cNvCxnSpPr/>
+          <p:nvPr/>
+        </p:nvCxnSpPr>
+        <p:spPr>
+          <a:xfrm>
+            <a:off x="6256947" y="1647358"/>
+            <a:ext cx="0" cy="1693415"/>
+          </a:xfrm>
+          <a:prstGeom prst="straightConnector1">
+            <a:avLst/>
+          </a:prstGeom>
+          <a:ln>
+            <a:solidFill>
+              <a:schemeClr val="tx1"/>
+            </a:solidFill>
+            <a:tailEnd type="arrow"/>
+          </a:ln>
+        </p:spPr>
+        <p:style>
+          <a:lnRef idx="2">
+            <a:schemeClr val="accent1"/>
+          </a:lnRef>
+          <a:fillRef idx="0">
+            <a:schemeClr val="accent1"/>
+          </a:fillRef>
+          <a:effectRef idx="1">
+            <a:schemeClr val="accent1"/>
+          </a:effectRef>
+          <a:fontRef idx="minor">
+            <a:schemeClr val="tx1"/>
+          </a:fontRef>
+        </p:style>
+      </p:cxnSp>
+      <p:sp>
+        <p:nvSpPr>
+          <p:cNvPr id="16" name="TextBox 15"/>
+          <p:cNvSpPr txBox="1"/>
+          <p:nvPr/>
+        </p:nvSpPr>
+        <p:spPr>
+          <a:xfrm>
+            <a:off x="6256947" y="1634129"/>
+            <a:ext cx="727552" cy="369332"/>
+          </a:xfrm>
+          <a:prstGeom prst="rect">
+            <a:avLst/>
+          </a:prstGeom>
+          <a:noFill/>
+        </p:spPr>
+        <p:txBody>
+          <a:bodyPr wrap="square" rtlCol="0">
+            <a:spAutoFit/>
+          </a:bodyPr>
+          <a:lstStyle/>
+          <a:p>
+            <a:r>
+              <a:rPr lang="en-US" dirty="0" err="1" smtClean="0"/>
+              <a:t>ω</a:t>
+            </a:r>
+            <a:r>
+              <a:rPr lang="en-US" dirty="0" smtClean="0"/>
+              <a:t>/</a:t>
+            </a:r>
+            <a:r>
+              <a:rPr lang="en-US" dirty="0" err="1" smtClean="0"/>
+              <a:t>γ</a:t>
+            </a:r>
+            <a:endParaRPr lang="en-US" dirty="0"/>
+          </a:p>
+        </p:txBody>
+      </p:sp>
+      <p:sp>
+        <p:nvSpPr>
+          <p:cNvPr id="17" name="TextBox 16"/>
+          <p:cNvSpPr txBox="1"/>
+          <p:nvPr/>
+        </p:nvSpPr>
+        <p:spPr>
+          <a:xfrm>
+            <a:off x="6144508" y="4862205"/>
+            <a:ext cx="628336" cy="369332"/>
+          </a:xfrm>
+          <a:prstGeom prst="rect">
+            <a:avLst/>
+          </a:prstGeom>
+          <a:noFill/>
+        </p:spPr>
+        <p:txBody>
+          <a:bodyPr wrap="square" rtlCol="0">
+            <a:spAutoFit/>
+          </a:bodyPr>
+          <a:lstStyle/>
+          <a:p>
+            <a:r>
+              <a:rPr lang="en-US" dirty="0" smtClean="0"/>
+              <a:t>B</a:t>
+            </a:r>
+            <a:r>
+              <a:rPr lang="en-US" baseline="-25000" dirty="0" smtClean="0"/>
+              <a:t>1</a:t>
+            </a:r>
+            <a:endParaRPr lang="en-US" baseline="-25000" dirty="0"/>
+          </a:p>
+        </p:txBody>
+      </p:sp>
+      <p:sp>
+        <p:nvSpPr>
+          <p:cNvPr id="21" name="Right Arrow 20"/>
+          <p:cNvSpPr/>
+          <p:nvPr/>
+        </p:nvSpPr>
+        <p:spPr>
+          <a:xfrm>
+            <a:off x="4649713" y="3163019"/>
+            <a:ext cx="1005344" cy="423354"/>
+          </a:xfrm>
+          <a:prstGeom prst="rightArrow">
+            <a:avLst/>
+          </a:prstGeom>
+        </p:spPr>
+        <p:style>
+          <a:lnRef idx="1">
+            <a:schemeClr val="accent1"/>
+          </a:lnRef>
+          <a:fillRef idx="3">
+            <a:schemeClr val="accent1"/>
+          </a:fillRef>
+          <a:effectRef idx="2">
+            <a:schemeClr val="accent1"/>
+          </a:effectRef>
+          <a:fontRef idx="minor">
+            <a:schemeClr val="lt1"/>
+          </a:fontRef>
+        </p:style>
+        <p:txBody>
+          <a:bodyPr rtlCol="0" anchor="ctr"/>
+          <a:lstStyle/>
+          <a:p>
+            <a:pPr algn="ctr"/>
+            <a:endParaRPr lang="en-US"/>
+          </a:p>
+        </p:txBody>
+      </p:sp>
+      <p:cxnSp>
+        <p:nvCxnSpPr>
+          <p:cNvPr id="26" name="Straight Arrow Connector 25"/>
+          <p:cNvCxnSpPr/>
+          <p:nvPr/>
+        </p:nvCxnSpPr>
+        <p:spPr>
+          <a:xfrm flipH="1" flipV="1">
+            <a:off x="3684296" y="3163019"/>
+            <a:ext cx="2" cy="1687059"/>
+          </a:xfrm>
+          <a:prstGeom prst="straightConnector1">
+            <a:avLst/>
+          </a:prstGeom>
+          <a:ln>
+            <a:solidFill>
+              <a:schemeClr val="tx1"/>
+            </a:solidFill>
+            <a:tailEnd type="arrow"/>
+          </a:ln>
+        </p:spPr>
+        <p:style>
+          <a:lnRef idx="2">
+            <a:schemeClr val="accent1"/>
+          </a:lnRef>
+          <a:fillRef idx="0">
+            <a:schemeClr val="accent1"/>
+          </a:fillRef>
+          <a:effectRef idx="1">
+            <a:schemeClr val="accent1"/>
+          </a:effectRef>
+          <a:fontRef idx="minor">
+            <a:schemeClr val="tx1"/>
+          </a:fontRef>
+        </p:style>
+      </p:cxnSp>
+      <p:cxnSp>
+        <p:nvCxnSpPr>
+          <p:cNvPr id="27" name="Straight Arrow Connector 26"/>
+          <p:cNvCxnSpPr/>
+          <p:nvPr/>
+        </p:nvCxnSpPr>
+        <p:spPr>
+          <a:xfrm>
+            <a:off x="3803839" y="3163019"/>
+            <a:ext cx="0" cy="1693415"/>
+          </a:xfrm>
+          <a:prstGeom prst="straightConnector1">
+            <a:avLst/>
+          </a:prstGeom>
+          <a:ln>
+            <a:solidFill>
+              <a:schemeClr val="tx1"/>
+            </a:solidFill>
+            <a:tailEnd type="arrow"/>
+          </a:ln>
+        </p:spPr>
+        <p:style>
+          <a:lnRef idx="2">
+            <a:schemeClr val="accent1"/>
+          </a:lnRef>
+          <a:fillRef idx="0">
+            <a:schemeClr val="accent1"/>
+          </a:fillRef>
+          <a:effectRef idx="1">
+            <a:schemeClr val="accent1"/>
+          </a:effectRef>
+          <a:fontRef idx="minor">
+            <a:schemeClr val="tx1"/>
+          </a:fontRef>
+        </p:style>
+      </p:cxnSp>
+      <p:sp>
+        <p:nvSpPr>
+          <p:cNvPr id="28" name="TextBox 27"/>
+          <p:cNvSpPr txBox="1"/>
+          <p:nvPr/>
+        </p:nvSpPr>
+        <p:spPr>
+          <a:xfrm>
+            <a:off x="3803357" y="4862205"/>
+            <a:ext cx="813289" cy="369332"/>
+          </a:xfrm>
+          <a:prstGeom prst="rect">
+            <a:avLst/>
+          </a:prstGeom>
+          <a:noFill/>
+        </p:spPr>
+        <p:txBody>
+          <a:bodyPr wrap="square" rtlCol="0">
+            <a:spAutoFit/>
+          </a:bodyPr>
+          <a:lstStyle/>
+          <a:p>
+            <a:r>
+              <a:rPr lang="en-US" dirty="0" smtClean="0"/>
+              <a:t>B</a:t>
+            </a:r>
+            <a:r>
+              <a:rPr lang="en-US" baseline="-25000" dirty="0" smtClean="0"/>
+              <a:t>1</a:t>
+            </a:r>
+            <a:r>
+              <a:rPr lang="en-US" dirty="0" smtClean="0"/>
+              <a:t>, </a:t>
+            </a:r>
+            <a:r>
+              <a:rPr lang="en-US" dirty="0" err="1" smtClean="0"/>
+              <a:t>B</a:t>
+            </a:r>
+            <a:r>
+              <a:rPr lang="en-US" baseline="-25000" dirty="0" err="1" smtClean="0"/>
+              <a:t>eff</a:t>
+            </a:r>
+            <a:endParaRPr lang="en-US" baseline="-25000" dirty="0"/>
+          </a:p>
+        </p:txBody>
+      </p:sp>
+      <p:cxnSp>
+        <p:nvCxnSpPr>
+          <p:cNvPr id="29" name="Straight Arrow Connector 28"/>
+          <p:cNvCxnSpPr/>
+          <p:nvPr/>
+        </p:nvCxnSpPr>
+        <p:spPr>
+          <a:xfrm>
+            <a:off x="3796739" y="4850078"/>
+            <a:ext cx="661410" cy="1"/>
+          </a:xfrm>
+          <a:prstGeom prst="straightConnector1">
+            <a:avLst/>
+          </a:prstGeom>
+          <a:ln>
+            <a:solidFill>
+              <a:srgbClr val="000000"/>
+            </a:solidFill>
+            <a:tailEnd type="arrow"/>
+          </a:ln>
+        </p:spPr>
+        <p:style>
+          <a:lnRef idx="2">
+            <a:schemeClr val="accent1"/>
+          </a:lnRef>
+          <a:fillRef idx="0">
+            <a:schemeClr val="accent1"/>
+          </a:fillRef>
+          <a:effectRef idx="1">
+            <a:schemeClr val="accent1"/>
+          </a:effectRef>
+          <a:fontRef idx="minor">
+            <a:schemeClr val="tx1"/>
+          </a:fontRef>
+        </p:style>
+      </p:cxnSp>
+      <p:sp>
+        <p:nvSpPr>
+          <p:cNvPr id="31" name="TextBox 30"/>
+          <p:cNvSpPr txBox="1"/>
+          <p:nvPr/>
+        </p:nvSpPr>
+        <p:spPr>
+          <a:xfrm>
+            <a:off x="3817067" y="3384324"/>
+            <a:ext cx="727552" cy="369332"/>
+          </a:xfrm>
+          <a:prstGeom prst="rect">
+            <a:avLst/>
+          </a:prstGeom>
+          <a:noFill/>
+        </p:spPr>
+        <p:txBody>
+          <a:bodyPr wrap="square" rtlCol="0">
+            <a:spAutoFit/>
+          </a:bodyPr>
+          <a:lstStyle/>
+          <a:p>
+            <a:r>
+              <a:rPr lang="en-US" dirty="0" err="1" smtClean="0"/>
+              <a:t>ω</a:t>
+            </a:r>
+            <a:r>
+              <a:rPr lang="en-US" dirty="0" smtClean="0"/>
+              <a:t>/</a:t>
+            </a:r>
+            <a:r>
+              <a:rPr lang="en-US" dirty="0" err="1" smtClean="0"/>
+              <a:t>γ</a:t>
+            </a:r>
+            <a:endParaRPr lang="en-US" dirty="0"/>
+          </a:p>
+        </p:txBody>
+      </p:sp>
+      <p:sp>
+        <p:nvSpPr>
+          <p:cNvPr id="32" name="Curved Left Arrow 31"/>
+          <p:cNvSpPr/>
+          <p:nvPr/>
+        </p:nvSpPr>
+        <p:spPr>
+          <a:xfrm>
+            <a:off x="4021618" y="3990140"/>
+            <a:ext cx="291020" cy="515962"/>
+          </a:xfrm>
+          <a:prstGeom prst="curvedLeftArrow">
+            <a:avLst/>
+          </a:prstGeom>
+        </p:spPr>
+        <p:style>
+          <a:lnRef idx="1">
+            <a:schemeClr val="dk1"/>
+          </a:lnRef>
+          <a:fillRef idx="3">
+            <a:schemeClr val="dk1"/>
+          </a:fillRef>
+          <a:effectRef idx="2">
+            <a:schemeClr val="dk1"/>
+          </a:effectRef>
+          <a:fontRef idx="minor">
+            <a:schemeClr val="lt1"/>
+          </a:fontRef>
+        </p:style>
+        <p:txBody>
+          <a:bodyPr rtlCol="0" anchor="ctr"/>
+          <a:lstStyle/>
+          <a:p>
+            <a:pPr algn="ctr"/>
+            <a:endParaRPr lang="en-US">
+              <a:solidFill>
+                <a:schemeClr val="tx1"/>
+              </a:solidFill>
+            </a:endParaRPr>
+          </a:p>
+        </p:txBody>
+      </p:sp>
+      <p:sp>
+        <p:nvSpPr>
+          <p:cNvPr id="33" name="TextBox 32"/>
+          <p:cNvSpPr txBox="1"/>
+          <p:nvPr/>
+        </p:nvSpPr>
+        <p:spPr>
+          <a:xfrm>
+            <a:off x="4345709" y="3990140"/>
+            <a:ext cx="224879" cy="369332"/>
+          </a:xfrm>
+          <a:prstGeom prst="rect">
+            <a:avLst/>
+          </a:prstGeom>
+          <a:noFill/>
+        </p:spPr>
+        <p:txBody>
+          <a:bodyPr wrap="square" rtlCol="0">
+            <a:spAutoFit/>
+          </a:bodyPr>
+          <a:lstStyle/>
+          <a:p>
+            <a:r>
+              <a:rPr lang="en-US" dirty="0" err="1" smtClean="0"/>
+              <a:t>ω</a:t>
+            </a:r>
+            <a:endParaRPr lang="en-US" dirty="0"/>
+          </a:p>
+        </p:txBody>
+      </p:sp>
+      <p:sp>
+        <p:nvSpPr>
+          <p:cNvPr id="34" name="TextBox 33"/>
+          <p:cNvSpPr txBox="1"/>
+          <p:nvPr/>
+        </p:nvSpPr>
+        <p:spPr>
+          <a:xfrm>
+            <a:off x="3326894" y="3919833"/>
+            <a:ext cx="410075" cy="369332"/>
+          </a:xfrm>
+          <a:prstGeom prst="rect">
+            <a:avLst/>
+          </a:prstGeom>
+          <a:noFill/>
+        </p:spPr>
+        <p:txBody>
+          <a:bodyPr wrap="square" rtlCol="0">
+            <a:spAutoFit/>
+          </a:bodyPr>
+          <a:lstStyle/>
+          <a:p>
+            <a:r>
+              <a:rPr lang="en-US" dirty="0" smtClean="0"/>
+              <a:t>B</a:t>
+            </a:r>
+            <a:endParaRPr lang="en-US" dirty="0"/>
+          </a:p>
+        </p:txBody>
+      </p:sp>
+      <p:cxnSp>
+        <p:nvCxnSpPr>
+          <p:cNvPr id="36" name="Straight Arrow Connector 35"/>
+          <p:cNvCxnSpPr/>
+          <p:nvPr/>
+        </p:nvCxnSpPr>
+        <p:spPr>
+          <a:xfrm>
+            <a:off x="1581293" y="4016588"/>
+            <a:ext cx="661410" cy="1"/>
+          </a:xfrm>
+          <a:prstGeom prst="straightConnector1">
+            <a:avLst/>
+          </a:prstGeom>
+          <a:ln>
+            <a:solidFill>
+              <a:srgbClr val="000000"/>
+            </a:solidFill>
+            <a:tailEnd type="arrow"/>
+          </a:ln>
+        </p:spPr>
+        <p:style>
+          <a:lnRef idx="2">
+            <a:schemeClr val="accent1"/>
+          </a:lnRef>
+          <a:fillRef idx="0">
+            <a:schemeClr val="accent1"/>
+          </a:fillRef>
+          <a:effectRef idx="1">
+            <a:schemeClr val="accent1"/>
+          </a:effectRef>
+          <a:fontRef idx="minor">
+            <a:schemeClr val="tx1"/>
+          </a:fontRef>
+        </p:style>
+      </p:cxnSp>
+      <p:cxnSp>
+        <p:nvCxnSpPr>
+          <p:cNvPr id="37" name="Straight Arrow Connector 36"/>
+          <p:cNvCxnSpPr/>
+          <p:nvPr/>
+        </p:nvCxnSpPr>
+        <p:spPr>
+          <a:xfrm>
+            <a:off x="1581293" y="3231270"/>
+            <a:ext cx="0" cy="1693415"/>
+          </a:xfrm>
+          <a:prstGeom prst="straightConnector1">
+            <a:avLst/>
+          </a:prstGeom>
+          <a:ln>
+            <a:solidFill>
+              <a:schemeClr val="tx1"/>
+            </a:solidFill>
+            <a:tailEnd type="arrow"/>
+          </a:ln>
+        </p:spPr>
+        <p:style>
+          <a:lnRef idx="2">
+            <a:schemeClr val="accent1"/>
+          </a:lnRef>
+          <a:fillRef idx="0">
+            <a:schemeClr val="accent1"/>
+          </a:fillRef>
+          <a:effectRef idx="1">
+            <a:schemeClr val="accent1"/>
+          </a:effectRef>
+          <a:fontRef idx="minor">
+            <a:schemeClr val="tx1"/>
+          </a:fontRef>
+        </p:style>
+      </p:cxnSp>
+      <p:cxnSp>
+        <p:nvCxnSpPr>
+          <p:cNvPr id="30" name="Straight Arrow Connector 29"/>
+          <p:cNvCxnSpPr/>
+          <p:nvPr/>
+        </p:nvCxnSpPr>
+        <p:spPr>
+          <a:xfrm flipV="1">
+            <a:off x="1449011" y="3224404"/>
+            <a:ext cx="0" cy="805414"/>
+          </a:xfrm>
+          <a:prstGeom prst="straightConnector1">
+            <a:avLst/>
+          </a:prstGeom>
+          <a:ln>
+            <a:solidFill>
+              <a:srgbClr val="000000"/>
+            </a:solidFill>
+            <a:tailEnd type="arrow"/>
+          </a:ln>
+        </p:spPr>
+        <p:style>
+          <a:lnRef idx="2">
+            <a:schemeClr val="accent1"/>
+          </a:lnRef>
+          <a:fillRef idx="0">
+            <a:schemeClr val="accent1"/>
+          </a:fillRef>
+          <a:effectRef idx="1">
+            <a:schemeClr val="accent1"/>
+          </a:effectRef>
+          <a:fontRef idx="minor">
+            <a:schemeClr val="tx1"/>
+          </a:fontRef>
+        </p:style>
+      </p:cxnSp>
+      <p:sp>
+        <p:nvSpPr>
+          <p:cNvPr id="44" name="Curved Left Arrow 43"/>
+          <p:cNvSpPr/>
+          <p:nvPr/>
+        </p:nvSpPr>
+        <p:spPr>
+          <a:xfrm>
+            <a:off x="1713576" y="3390079"/>
+            <a:ext cx="291020" cy="515962"/>
+          </a:xfrm>
+          <a:prstGeom prst="curvedLeftArrow">
+            <a:avLst/>
+          </a:prstGeom>
+        </p:spPr>
+        <p:style>
+          <a:lnRef idx="1">
+            <a:schemeClr val="dk1"/>
+          </a:lnRef>
+          <a:fillRef idx="3">
+            <a:schemeClr val="dk1"/>
+          </a:fillRef>
+          <a:effectRef idx="2">
+            <a:schemeClr val="dk1"/>
+          </a:effectRef>
+          <a:fontRef idx="minor">
+            <a:schemeClr val="lt1"/>
+          </a:fontRef>
+        </p:style>
+        <p:txBody>
+          <a:bodyPr rtlCol="0" anchor="ctr"/>
+          <a:lstStyle/>
+          <a:p>
+            <a:pPr algn="ctr"/>
+            <a:endParaRPr lang="en-US">
+              <a:solidFill>
+                <a:schemeClr val="tx1"/>
+              </a:solidFill>
+            </a:endParaRPr>
+          </a:p>
+        </p:txBody>
+      </p:sp>
+      <p:sp>
+        <p:nvSpPr>
+          <p:cNvPr id="45" name="TextBox 44"/>
+          <p:cNvSpPr txBox="1"/>
+          <p:nvPr/>
+        </p:nvSpPr>
+        <p:spPr>
+          <a:xfrm>
+            <a:off x="2037667" y="3390079"/>
+            <a:ext cx="224879" cy="369332"/>
+          </a:xfrm>
+          <a:prstGeom prst="rect">
+            <a:avLst/>
+          </a:prstGeom>
+          <a:noFill/>
+        </p:spPr>
+        <p:txBody>
+          <a:bodyPr wrap="square" rtlCol="0">
+            <a:spAutoFit/>
+          </a:bodyPr>
+          <a:lstStyle/>
+          <a:p>
+            <a:r>
+              <a:rPr lang="en-US" dirty="0" err="1" smtClean="0"/>
+              <a:t>ω</a:t>
+            </a:r>
+            <a:endParaRPr lang="en-US" dirty="0"/>
+          </a:p>
+        </p:txBody>
+      </p:sp>
+      <p:sp>
+        <p:nvSpPr>
+          <p:cNvPr id="46" name="TextBox 45"/>
+          <p:cNvSpPr txBox="1"/>
+          <p:nvPr/>
+        </p:nvSpPr>
+        <p:spPr>
+          <a:xfrm>
+            <a:off x="1000047" y="4338213"/>
+            <a:ext cx="727552" cy="369332"/>
+          </a:xfrm>
+          <a:prstGeom prst="rect">
+            <a:avLst/>
+          </a:prstGeom>
+          <a:noFill/>
+        </p:spPr>
+        <p:txBody>
+          <a:bodyPr wrap="square" rtlCol="0">
+            <a:spAutoFit/>
+          </a:bodyPr>
+          <a:lstStyle/>
+          <a:p>
+            <a:r>
+              <a:rPr lang="en-US" dirty="0" err="1" smtClean="0"/>
+              <a:t>ω</a:t>
+            </a:r>
+            <a:r>
+              <a:rPr lang="en-US" dirty="0" smtClean="0"/>
+              <a:t>/</a:t>
+            </a:r>
+            <a:r>
+              <a:rPr lang="en-US" dirty="0" err="1" smtClean="0"/>
+              <a:t>γ</a:t>
+            </a:r>
+            <a:endParaRPr lang="en-US" dirty="0"/>
+          </a:p>
+        </p:txBody>
+      </p:sp>
+      <p:cxnSp>
+        <p:nvCxnSpPr>
+          <p:cNvPr id="40" name="Straight Arrow Connector 39"/>
+          <p:cNvCxnSpPr/>
+          <p:nvPr/>
+        </p:nvCxnSpPr>
+        <p:spPr>
+          <a:xfrm>
+            <a:off x="1581293" y="4016588"/>
+            <a:ext cx="661410" cy="888001"/>
+          </a:xfrm>
+          <a:prstGeom prst="straightConnector1">
+            <a:avLst/>
+          </a:prstGeom>
+          <a:ln>
+            <a:solidFill>
+              <a:srgbClr val="000000"/>
+            </a:solidFill>
+            <a:tailEnd type="arrow"/>
+          </a:ln>
+        </p:spPr>
+        <p:style>
+          <a:lnRef idx="2">
+            <a:schemeClr val="accent1"/>
+          </a:lnRef>
+          <a:fillRef idx="0">
+            <a:schemeClr val="accent1"/>
+          </a:fillRef>
+          <a:effectRef idx="1">
+            <a:schemeClr val="accent1"/>
+          </a:effectRef>
+          <a:fontRef idx="minor">
+            <a:schemeClr val="tx1"/>
+          </a:fontRef>
+        </p:style>
+      </p:cxnSp>
+      <p:cxnSp>
+        <p:nvCxnSpPr>
+          <p:cNvPr id="48" name="Straight Connector 47"/>
+          <p:cNvCxnSpPr/>
+          <p:nvPr/>
+        </p:nvCxnSpPr>
+        <p:spPr>
+          <a:xfrm>
+            <a:off x="2242703" y="4016589"/>
+            <a:ext cx="0" cy="888000"/>
+          </a:xfrm>
+          <a:prstGeom prst="line">
+            <a:avLst/>
+          </a:prstGeom>
+          <a:ln>
+            <a:solidFill>
+              <a:srgbClr val="000000"/>
+            </a:solidFill>
+            <a:prstDash val="dash"/>
+          </a:ln>
+        </p:spPr>
+        <p:style>
+          <a:lnRef idx="2">
+            <a:schemeClr val="accent1"/>
+          </a:lnRef>
+          <a:fillRef idx="0">
+            <a:schemeClr val="accent1"/>
+          </a:fillRef>
+          <a:effectRef idx="1">
+            <a:schemeClr val="accent1"/>
+          </a:effectRef>
+          <a:fontRef idx="minor">
+            <a:schemeClr val="tx1"/>
+          </a:fontRef>
+        </p:style>
+      </p:cxnSp>
+      <p:cxnSp>
+        <p:nvCxnSpPr>
+          <p:cNvPr id="50" name="Straight Connector 49"/>
+          <p:cNvCxnSpPr/>
+          <p:nvPr/>
+        </p:nvCxnSpPr>
+        <p:spPr>
+          <a:xfrm flipH="1">
+            <a:off x="1561730" y="4918323"/>
+            <a:ext cx="661407" cy="0"/>
+          </a:xfrm>
+          <a:prstGeom prst="line">
+            <a:avLst/>
+          </a:prstGeom>
+          <a:ln>
+            <a:prstDash val="dash"/>
+          </a:ln>
+        </p:spPr>
+        <p:style>
+          <a:lnRef idx="2">
+            <a:schemeClr val="dk1"/>
+          </a:lnRef>
+          <a:fillRef idx="0">
+            <a:schemeClr val="dk1"/>
+          </a:fillRef>
+          <a:effectRef idx="1">
+            <a:schemeClr val="dk1"/>
+          </a:effectRef>
+          <a:fontRef idx="minor">
+            <a:schemeClr val="tx1"/>
+          </a:fontRef>
+        </p:style>
+      </p:cxnSp>
+      <p:sp>
+        <p:nvSpPr>
+          <p:cNvPr id="53" name="TextBox 52"/>
+          <p:cNvSpPr txBox="1"/>
+          <p:nvPr/>
+        </p:nvSpPr>
+        <p:spPr>
+          <a:xfrm>
+            <a:off x="1091848" y="3284239"/>
+            <a:ext cx="410075" cy="369332"/>
+          </a:xfrm>
+          <a:prstGeom prst="rect">
+            <a:avLst/>
+          </a:prstGeom>
+          <a:noFill/>
+        </p:spPr>
+        <p:txBody>
+          <a:bodyPr wrap="square" rtlCol="0">
+            <a:spAutoFit/>
+          </a:bodyPr>
+          <a:lstStyle/>
+          <a:p>
+            <a:r>
+              <a:rPr lang="en-US" dirty="0" smtClean="0"/>
+              <a:t>B</a:t>
+            </a:r>
+            <a:endParaRPr lang="en-US" dirty="0"/>
+          </a:p>
+        </p:txBody>
+      </p:sp>
+      <p:sp>
+        <p:nvSpPr>
+          <p:cNvPr id="54" name="TextBox 53"/>
+          <p:cNvSpPr txBox="1"/>
+          <p:nvPr/>
+        </p:nvSpPr>
+        <p:spPr>
+          <a:xfrm>
+            <a:off x="1911996" y="4153547"/>
+            <a:ext cx="793693" cy="369332"/>
+          </a:xfrm>
+          <a:prstGeom prst="rect">
+            <a:avLst/>
+          </a:prstGeom>
+          <a:noFill/>
+        </p:spPr>
+        <p:txBody>
+          <a:bodyPr wrap="square" rtlCol="0">
+            <a:spAutoFit/>
+          </a:bodyPr>
+          <a:lstStyle/>
+          <a:p>
+            <a:r>
+              <a:rPr lang="en-US" dirty="0" err="1" smtClean="0"/>
+              <a:t>B</a:t>
+            </a:r>
+            <a:r>
+              <a:rPr lang="en-US" baseline="-25000" dirty="0" err="1" smtClean="0"/>
+              <a:t>eff</a:t>
+            </a:r>
+            <a:endParaRPr lang="en-US" baseline="-25000" dirty="0"/>
+          </a:p>
+        </p:txBody>
+      </p:sp>
+      <p:sp>
+        <p:nvSpPr>
+          <p:cNvPr id="55" name="TextBox 54"/>
+          <p:cNvSpPr txBox="1"/>
+          <p:nvPr/>
+        </p:nvSpPr>
+        <p:spPr>
+          <a:xfrm>
+            <a:off x="2269675" y="3864086"/>
+            <a:ext cx="628336" cy="369332"/>
+          </a:xfrm>
+          <a:prstGeom prst="rect">
+            <a:avLst/>
+          </a:prstGeom>
+          <a:noFill/>
+        </p:spPr>
+        <p:txBody>
+          <a:bodyPr wrap="square" rtlCol="0">
+            <a:spAutoFit/>
+          </a:bodyPr>
+          <a:lstStyle/>
+          <a:p>
+            <a:r>
+              <a:rPr lang="en-US" dirty="0" smtClean="0"/>
+              <a:t>B</a:t>
+            </a:r>
+            <a:r>
+              <a:rPr lang="en-US" baseline="-25000" dirty="0" smtClean="0"/>
+              <a:t>1</a:t>
+            </a:r>
+            <a:endParaRPr lang="en-US" baseline="-25000" dirty="0"/>
+          </a:p>
+        </p:txBody>
+      </p:sp>
+      <p:sp>
+        <p:nvSpPr>
+          <p:cNvPr id="56" name="TextBox 55"/>
+          <p:cNvSpPr txBox="1"/>
+          <p:nvPr/>
+        </p:nvSpPr>
+        <p:spPr>
+          <a:xfrm>
+            <a:off x="1184444" y="5556512"/>
+            <a:ext cx="2367572" cy="646331"/>
+          </a:xfrm>
+          <a:prstGeom prst="rect">
+            <a:avLst/>
+          </a:prstGeom>
+          <a:noFill/>
+        </p:spPr>
+        <p:txBody>
+          <a:bodyPr wrap="square" rtlCol="0">
+            <a:spAutoFit/>
+          </a:bodyPr>
+          <a:lstStyle/>
+          <a:p>
+            <a:r>
+              <a:rPr lang="en-US" dirty="0" smtClean="0"/>
+              <a:t>Before resonance</a:t>
+            </a:r>
+          </a:p>
+          <a:p>
+            <a:endParaRPr lang="en-US" dirty="0"/>
+          </a:p>
+        </p:txBody>
+      </p:sp>
+      <p:sp>
+        <p:nvSpPr>
+          <p:cNvPr id="58" name="TextBox 57"/>
+          <p:cNvSpPr txBox="1"/>
+          <p:nvPr/>
+        </p:nvSpPr>
+        <p:spPr>
+          <a:xfrm>
+            <a:off x="3399650" y="5556512"/>
+            <a:ext cx="1587385" cy="369332"/>
+          </a:xfrm>
+          <a:prstGeom prst="rect">
+            <a:avLst/>
+          </a:prstGeom>
+          <a:noFill/>
+        </p:spPr>
+        <p:txBody>
+          <a:bodyPr wrap="square" rtlCol="0">
+            <a:spAutoFit/>
+          </a:bodyPr>
+          <a:lstStyle/>
+          <a:p>
+            <a:r>
+              <a:rPr lang="en-US" dirty="0" smtClean="0"/>
+              <a:t>On resonance</a:t>
+            </a:r>
+            <a:endParaRPr lang="en-US" dirty="0"/>
+          </a:p>
+        </p:txBody>
+      </p:sp>
+      <p:sp>
+        <p:nvSpPr>
+          <p:cNvPr id="59" name="TextBox 58"/>
+          <p:cNvSpPr txBox="1"/>
+          <p:nvPr/>
+        </p:nvSpPr>
+        <p:spPr>
+          <a:xfrm>
+            <a:off x="5780724" y="5556512"/>
+            <a:ext cx="1799040" cy="369332"/>
+          </a:xfrm>
+          <a:prstGeom prst="rect">
+            <a:avLst/>
+          </a:prstGeom>
+          <a:noFill/>
+        </p:spPr>
+        <p:txBody>
+          <a:bodyPr wrap="square" rtlCol="0">
+            <a:spAutoFit/>
+          </a:bodyPr>
+          <a:lstStyle/>
+          <a:p>
+            <a:r>
+              <a:rPr lang="en-US" dirty="0" smtClean="0"/>
+              <a:t>After resonance</a:t>
+            </a:r>
+            <a:endParaRPr lang="en-US" dirty="0"/>
+          </a:p>
+        </p:txBody>
+      </p:sp>
+      <p:sp>
+        <p:nvSpPr>
+          <p:cNvPr id="61" name="Right Arrow 60"/>
+          <p:cNvSpPr/>
+          <p:nvPr/>
+        </p:nvSpPr>
+        <p:spPr>
+          <a:xfrm>
+            <a:off x="2454867" y="3231270"/>
+            <a:ext cx="1005344" cy="423354"/>
+          </a:xfrm>
+          <a:prstGeom prst="rightArrow">
+            <a:avLst/>
+          </a:prstGeom>
+        </p:spPr>
+        <p:style>
+          <a:lnRef idx="1">
+            <a:schemeClr val="accent1"/>
+          </a:lnRef>
+          <a:fillRef idx="3">
+            <a:schemeClr val="accent1"/>
+          </a:fillRef>
+          <a:effectRef idx="2">
+            <a:schemeClr val="accent1"/>
+          </a:effectRef>
+          <a:fontRef idx="minor">
+            <a:schemeClr val="lt1"/>
+          </a:fontRef>
+        </p:style>
+        <p:txBody>
+          <a:bodyPr rtlCol="0" anchor="ctr"/>
+          <a:lstStyle/>
+          <a:p>
+            <a:pPr algn="ctr"/>
+            <a:endParaRPr lang="en-US"/>
           </a:p>
         </p:txBody>
       </p:sp>

</xml_diff>

<commit_message>
Make more changes to the second draft of the polarimetry chapter.
</commit_message>
<xml_diff>
--- a/EffectiveField.pptx
+++ b/EffectiveField.pptx
@@ -288,9 +288,9 @@
           <a:p>
             <a:fld id="{64796449-2767-4C4F-B318-75F84B20A392}" type="datetimeFigureOut">
               <a:rPr lang="en-US" smtClean="0"/>
-              <a:t>5/13/16</a:t>
+              <a:t>9/7/16</a:t>
             </a:fld>
-            <a:endParaRPr lang="en-US"/>
+            <a:endParaRPr lang="en-US" dirty="0"/>
           </a:p>
         </p:txBody>
       </p:sp>
@@ -309,7 +309,7 @@
           <a:bodyPr/>
           <a:lstStyle/>
           <a:p>
-            <a:endParaRPr lang="en-US"/>
+            <a:endParaRPr lang="en-US" dirty="0"/>
           </a:p>
         </p:txBody>
       </p:sp>
@@ -332,7 +332,7 @@
               <a:rPr lang="en-US" smtClean="0"/>
               <a:t>‹#›</a:t>
             </a:fld>
-            <a:endParaRPr lang="en-US"/>
+            <a:endParaRPr lang="en-US" dirty="0"/>
           </a:p>
         </p:txBody>
       </p:sp>
@@ -458,9 +458,9 @@
           <a:p>
             <a:fld id="{64796449-2767-4C4F-B318-75F84B20A392}" type="datetimeFigureOut">
               <a:rPr lang="en-US" smtClean="0"/>
-              <a:t>5/13/16</a:t>
+              <a:t>9/7/16</a:t>
             </a:fld>
-            <a:endParaRPr lang="en-US"/>
+            <a:endParaRPr lang="en-US" dirty="0"/>
           </a:p>
         </p:txBody>
       </p:sp>
@@ -479,7 +479,7 @@
           <a:bodyPr/>
           <a:lstStyle/>
           <a:p>
-            <a:endParaRPr lang="en-US"/>
+            <a:endParaRPr lang="en-US" dirty="0"/>
           </a:p>
         </p:txBody>
       </p:sp>
@@ -502,7 +502,7 @@
               <a:rPr lang="en-US" smtClean="0"/>
               <a:t>‹#›</a:t>
             </a:fld>
-            <a:endParaRPr lang="en-US"/>
+            <a:endParaRPr lang="en-US" dirty="0"/>
           </a:p>
         </p:txBody>
       </p:sp>
@@ -638,9 +638,9 @@
           <a:p>
             <a:fld id="{64796449-2767-4C4F-B318-75F84B20A392}" type="datetimeFigureOut">
               <a:rPr lang="en-US" smtClean="0"/>
-              <a:t>5/13/16</a:t>
+              <a:t>9/7/16</a:t>
             </a:fld>
-            <a:endParaRPr lang="en-US"/>
+            <a:endParaRPr lang="en-US" dirty="0"/>
           </a:p>
         </p:txBody>
       </p:sp>
@@ -659,7 +659,7 @@
           <a:bodyPr/>
           <a:lstStyle/>
           <a:p>
-            <a:endParaRPr lang="en-US"/>
+            <a:endParaRPr lang="en-US" dirty="0"/>
           </a:p>
         </p:txBody>
       </p:sp>
@@ -682,7 +682,7 @@
               <a:rPr lang="en-US" smtClean="0"/>
               <a:t>‹#›</a:t>
             </a:fld>
-            <a:endParaRPr lang="en-US"/>
+            <a:endParaRPr lang="en-US" dirty="0"/>
           </a:p>
         </p:txBody>
       </p:sp>
@@ -808,9 +808,9 @@
           <a:p>
             <a:fld id="{64796449-2767-4C4F-B318-75F84B20A392}" type="datetimeFigureOut">
               <a:rPr lang="en-US" smtClean="0"/>
-              <a:t>5/13/16</a:t>
+              <a:t>9/7/16</a:t>
             </a:fld>
-            <a:endParaRPr lang="en-US"/>
+            <a:endParaRPr lang="en-US" dirty="0"/>
           </a:p>
         </p:txBody>
       </p:sp>
@@ -829,7 +829,7 @@
           <a:bodyPr/>
           <a:lstStyle/>
           <a:p>
-            <a:endParaRPr lang="en-US"/>
+            <a:endParaRPr lang="en-US" dirty="0"/>
           </a:p>
         </p:txBody>
       </p:sp>
@@ -852,7 +852,7 @@
               <a:rPr lang="en-US" smtClean="0"/>
               <a:t>‹#›</a:t>
             </a:fld>
-            <a:endParaRPr lang="en-US"/>
+            <a:endParaRPr lang="en-US" dirty="0"/>
           </a:p>
         </p:txBody>
       </p:sp>
@@ -1054,9 +1054,9 @@
           <a:p>
             <a:fld id="{64796449-2767-4C4F-B318-75F84B20A392}" type="datetimeFigureOut">
               <a:rPr lang="en-US" smtClean="0"/>
-              <a:t>5/13/16</a:t>
+              <a:t>9/7/16</a:t>
             </a:fld>
-            <a:endParaRPr lang="en-US"/>
+            <a:endParaRPr lang="en-US" dirty="0"/>
           </a:p>
         </p:txBody>
       </p:sp>
@@ -1075,7 +1075,7 @@
           <a:bodyPr/>
           <a:lstStyle/>
           <a:p>
-            <a:endParaRPr lang="en-US"/>
+            <a:endParaRPr lang="en-US" dirty="0"/>
           </a:p>
         </p:txBody>
       </p:sp>
@@ -1098,7 +1098,7 @@
               <a:rPr lang="en-US" smtClean="0"/>
               <a:t>‹#›</a:t>
             </a:fld>
-            <a:endParaRPr lang="en-US"/>
+            <a:endParaRPr lang="en-US" dirty="0"/>
           </a:p>
         </p:txBody>
       </p:sp>
@@ -1342,9 +1342,9 @@
           <a:p>
             <a:fld id="{64796449-2767-4C4F-B318-75F84B20A392}" type="datetimeFigureOut">
               <a:rPr lang="en-US" smtClean="0"/>
-              <a:t>5/13/16</a:t>
+              <a:t>9/7/16</a:t>
             </a:fld>
-            <a:endParaRPr lang="en-US"/>
+            <a:endParaRPr lang="en-US" dirty="0"/>
           </a:p>
         </p:txBody>
       </p:sp>
@@ -1363,7 +1363,7 @@
           <a:bodyPr/>
           <a:lstStyle/>
           <a:p>
-            <a:endParaRPr lang="en-US"/>
+            <a:endParaRPr lang="en-US" dirty="0"/>
           </a:p>
         </p:txBody>
       </p:sp>
@@ -1386,7 +1386,7 @@
               <a:rPr lang="en-US" smtClean="0"/>
               <a:t>‹#›</a:t>
             </a:fld>
-            <a:endParaRPr lang="en-US"/>
+            <a:endParaRPr lang="en-US" dirty="0"/>
           </a:p>
         </p:txBody>
       </p:sp>
@@ -1764,9 +1764,9 @@
           <a:p>
             <a:fld id="{64796449-2767-4C4F-B318-75F84B20A392}" type="datetimeFigureOut">
               <a:rPr lang="en-US" smtClean="0"/>
-              <a:t>5/13/16</a:t>
+              <a:t>9/7/16</a:t>
             </a:fld>
-            <a:endParaRPr lang="en-US"/>
+            <a:endParaRPr lang="en-US" dirty="0"/>
           </a:p>
         </p:txBody>
       </p:sp>
@@ -1785,7 +1785,7 @@
           <a:bodyPr/>
           <a:lstStyle/>
           <a:p>
-            <a:endParaRPr lang="en-US"/>
+            <a:endParaRPr lang="en-US" dirty="0"/>
           </a:p>
         </p:txBody>
       </p:sp>
@@ -1808,7 +1808,7 @@
               <a:rPr lang="en-US" smtClean="0"/>
               <a:t>‹#›</a:t>
             </a:fld>
-            <a:endParaRPr lang="en-US"/>
+            <a:endParaRPr lang="en-US" dirty="0"/>
           </a:p>
         </p:txBody>
       </p:sp>
@@ -1882,9 +1882,9 @@
           <a:p>
             <a:fld id="{64796449-2767-4C4F-B318-75F84B20A392}" type="datetimeFigureOut">
               <a:rPr lang="en-US" smtClean="0"/>
-              <a:t>5/13/16</a:t>
+              <a:t>9/7/16</a:t>
             </a:fld>
-            <a:endParaRPr lang="en-US"/>
+            <a:endParaRPr lang="en-US" dirty="0"/>
           </a:p>
         </p:txBody>
       </p:sp>
@@ -1903,7 +1903,7 @@
           <a:bodyPr/>
           <a:lstStyle/>
           <a:p>
-            <a:endParaRPr lang="en-US"/>
+            <a:endParaRPr lang="en-US" dirty="0"/>
           </a:p>
         </p:txBody>
       </p:sp>
@@ -1926,7 +1926,7 @@
               <a:rPr lang="en-US" smtClean="0"/>
               <a:t>‹#›</a:t>
             </a:fld>
-            <a:endParaRPr lang="en-US"/>
+            <a:endParaRPr lang="en-US" dirty="0"/>
           </a:p>
         </p:txBody>
       </p:sp>
@@ -1977,9 +1977,9 @@
           <a:p>
             <a:fld id="{64796449-2767-4C4F-B318-75F84B20A392}" type="datetimeFigureOut">
               <a:rPr lang="en-US" smtClean="0"/>
-              <a:t>5/13/16</a:t>
+              <a:t>9/7/16</a:t>
             </a:fld>
-            <a:endParaRPr lang="en-US"/>
+            <a:endParaRPr lang="en-US" dirty="0"/>
           </a:p>
         </p:txBody>
       </p:sp>
@@ -1998,7 +1998,7 @@
           <a:bodyPr/>
           <a:lstStyle/>
           <a:p>
-            <a:endParaRPr lang="en-US"/>
+            <a:endParaRPr lang="en-US" dirty="0"/>
           </a:p>
         </p:txBody>
       </p:sp>
@@ -2021,7 +2021,7 @@
               <a:rPr lang="en-US" smtClean="0"/>
               <a:t>‹#›</a:t>
             </a:fld>
-            <a:endParaRPr lang="en-US"/>
+            <a:endParaRPr lang="en-US" dirty="0"/>
           </a:p>
         </p:txBody>
       </p:sp>
@@ -2254,9 +2254,9 @@
           <a:p>
             <a:fld id="{64796449-2767-4C4F-B318-75F84B20A392}" type="datetimeFigureOut">
               <a:rPr lang="en-US" smtClean="0"/>
-              <a:t>5/13/16</a:t>
+              <a:t>9/7/16</a:t>
             </a:fld>
-            <a:endParaRPr lang="en-US"/>
+            <a:endParaRPr lang="en-US" dirty="0"/>
           </a:p>
         </p:txBody>
       </p:sp>
@@ -2275,7 +2275,7 @@
           <a:bodyPr/>
           <a:lstStyle/>
           <a:p>
-            <a:endParaRPr lang="en-US"/>
+            <a:endParaRPr lang="en-US" dirty="0"/>
           </a:p>
         </p:txBody>
       </p:sp>
@@ -2298,7 +2298,7 @@
               <a:rPr lang="en-US" smtClean="0"/>
               <a:t>‹#›</a:t>
             </a:fld>
-            <a:endParaRPr lang="en-US"/>
+            <a:endParaRPr lang="en-US" dirty="0"/>
           </a:p>
         </p:txBody>
       </p:sp>
@@ -2421,7 +2421,7 @@
             </a:lvl9pPr>
           </a:lstStyle>
           <a:p>
-            <a:endParaRPr lang="en-US"/>
+            <a:endParaRPr lang="en-US" dirty="0"/>
           </a:p>
         </p:txBody>
       </p:sp>
@@ -2507,9 +2507,9 @@
           <a:p>
             <a:fld id="{64796449-2767-4C4F-B318-75F84B20A392}" type="datetimeFigureOut">
               <a:rPr lang="en-US" smtClean="0"/>
-              <a:t>5/13/16</a:t>
+              <a:t>9/7/16</a:t>
             </a:fld>
-            <a:endParaRPr lang="en-US"/>
+            <a:endParaRPr lang="en-US" dirty="0"/>
           </a:p>
         </p:txBody>
       </p:sp>
@@ -2528,7 +2528,7 @@
           <a:bodyPr/>
           <a:lstStyle/>
           <a:p>
-            <a:endParaRPr lang="en-US"/>
+            <a:endParaRPr lang="en-US" dirty="0"/>
           </a:p>
         </p:txBody>
       </p:sp>
@@ -2551,7 +2551,7 @@
               <a:rPr lang="en-US" smtClean="0"/>
               <a:t>‹#›</a:t>
             </a:fld>
-            <a:endParaRPr lang="en-US"/>
+            <a:endParaRPr lang="en-US" dirty="0"/>
           </a:p>
         </p:txBody>
       </p:sp>
@@ -2720,9 +2720,9 @@
           <a:p>
             <a:fld id="{64796449-2767-4C4F-B318-75F84B20A392}" type="datetimeFigureOut">
               <a:rPr lang="en-US" smtClean="0"/>
-              <a:t>5/13/16</a:t>
+              <a:t>9/7/16</a:t>
             </a:fld>
-            <a:endParaRPr lang="en-US"/>
+            <a:endParaRPr lang="en-US" dirty="0"/>
           </a:p>
         </p:txBody>
       </p:sp>
@@ -2759,7 +2759,7 @@
             </a:lvl1pPr>
           </a:lstStyle>
           <a:p>
-            <a:endParaRPr lang="en-US"/>
+            <a:endParaRPr lang="en-US" dirty="0"/>
           </a:p>
         </p:txBody>
       </p:sp>
@@ -2800,7 +2800,7 @@
               <a:rPr lang="en-US" smtClean="0"/>
               <a:t>‹#›</a:t>
             </a:fld>
-            <a:endParaRPr lang="en-US"/>
+            <a:endParaRPr lang="en-US" dirty="0"/>
           </a:p>
         </p:txBody>
       </p:sp>
@@ -3336,7 +3336,7 @@
           <a:lstStyle/>
           <a:p>
             <a:pPr algn="ctr"/>
-            <a:endParaRPr lang="en-US">
+            <a:endParaRPr lang="en-US" dirty="0">
               <a:solidFill>
                 <a:schemeClr val="tx1"/>
               </a:solidFill>
@@ -3367,7 +3367,7 @@
           <a:lstStyle/>
           <a:p>
             <a:r>
-              <a:rPr lang="en-US" dirty="0" err="1" smtClean="0"/>
+              <a:rPr lang="en-US" dirty="0" smtClean="0"/>
               <a:t>ω</a:t>
             </a:r>
             <a:endParaRPr lang="en-US" dirty="0"/>
@@ -3397,11 +3397,11 @@
           <a:lstStyle/>
           <a:p>
             <a:r>
-              <a:rPr lang="en-US" dirty="0" err="1" smtClean="0"/>
+              <a:rPr lang="en-US" dirty="0" smtClean="0"/>
               <a:t>B</a:t>
             </a:r>
             <a:r>
-              <a:rPr lang="en-US" baseline="-25000" dirty="0" err="1" smtClean="0"/>
+              <a:rPr lang="en-US" baseline="-25000" dirty="0" smtClean="0"/>
               <a:t>eff</a:t>
             </a:r>
             <a:endParaRPr lang="en-US" baseline="-25000" dirty="0"/>
@@ -3467,16 +3467,8 @@
           <a:lstStyle/>
           <a:p>
             <a:r>
-              <a:rPr lang="en-US" dirty="0" err="1" smtClean="0"/>
-              <a:t>ω</a:t>
-            </a:r>
-            <a:r>
               <a:rPr lang="en-US" dirty="0" smtClean="0"/>
-              <a:t>/</a:t>
-            </a:r>
-            <a:r>
-              <a:rPr lang="en-US" dirty="0" err="1" smtClean="0"/>
-              <a:t>γ</a:t>
+              <a:t>ω/γ</a:t>
             </a:r>
             <a:endParaRPr lang="en-US" dirty="0"/>
           </a:p>
@@ -3550,7 +3542,7 @@
           <a:lstStyle/>
           <a:p>
             <a:pPr algn="ctr"/>
-            <a:endParaRPr lang="en-US"/>
+            <a:endParaRPr lang="en-US" dirty="0"/>
           </a:p>
         </p:txBody>
       </p:sp>
@@ -3658,14 +3650,10 @@
             </a:r>
             <a:r>
               <a:rPr lang="en-US" dirty="0" smtClean="0"/>
-              <a:t>, </a:t>
-            </a:r>
-            <a:r>
-              <a:rPr lang="en-US" dirty="0" err="1" smtClean="0"/>
-              <a:t>B</a:t>
-            </a:r>
-            <a:r>
-              <a:rPr lang="en-US" baseline="-25000" dirty="0" err="1" smtClean="0"/>
+              <a:t>, B</a:t>
+            </a:r>
+            <a:r>
+              <a:rPr lang="en-US" baseline="-25000" dirty="0" smtClean="0"/>
               <a:t>eff</a:t>
             </a:r>
             <a:endParaRPr lang="en-US" baseline="-25000" dirty="0"/>
@@ -3731,16 +3719,8 @@
           <a:lstStyle/>
           <a:p>
             <a:r>
-              <a:rPr lang="en-US" dirty="0" err="1" smtClean="0"/>
-              <a:t>ω</a:t>
-            </a:r>
-            <a:r>
               <a:rPr lang="en-US" dirty="0" smtClean="0"/>
-              <a:t>/</a:t>
-            </a:r>
-            <a:r>
-              <a:rPr lang="en-US" dirty="0" err="1" smtClean="0"/>
-              <a:t>γ</a:t>
+              <a:t>ω/γ</a:t>
             </a:r>
             <a:endParaRPr lang="en-US" dirty="0"/>
           </a:p>
@@ -3780,7 +3760,7 @@
           <a:lstStyle/>
           <a:p>
             <a:pPr algn="ctr"/>
-            <a:endParaRPr lang="en-US">
+            <a:endParaRPr lang="en-US" dirty="0">
               <a:solidFill>
                 <a:schemeClr val="tx1"/>
               </a:solidFill>
@@ -3811,7 +3791,7 @@
           <a:lstStyle/>
           <a:p>
             <a:r>
-              <a:rPr lang="en-US" dirty="0" err="1" smtClean="0"/>
+              <a:rPr lang="en-US" dirty="0" smtClean="0"/>
               <a:t>ω</a:t>
             </a:r>
             <a:endParaRPr lang="en-US" dirty="0"/>
@@ -3990,7 +3970,7 @@
           <a:lstStyle/>
           <a:p>
             <a:pPr algn="ctr"/>
-            <a:endParaRPr lang="en-US">
+            <a:endParaRPr lang="en-US" dirty="0">
               <a:solidFill>
                 <a:schemeClr val="tx1"/>
               </a:solidFill>
@@ -4021,7 +4001,7 @@
           <a:lstStyle/>
           <a:p>
             <a:r>
-              <a:rPr lang="en-US" dirty="0" err="1" smtClean="0"/>
+              <a:rPr lang="en-US" dirty="0" smtClean="0"/>
               <a:t>ω</a:t>
             </a:r>
             <a:endParaRPr lang="en-US" dirty="0"/>
@@ -4051,16 +4031,8 @@
           <a:lstStyle/>
           <a:p>
             <a:r>
-              <a:rPr lang="en-US" dirty="0" err="1" smtClean="0"/>
-              <a:t>ω</a:t>
-            </a:r>
-            <a:r>
               <a:rPr lang="en-US" dirty="0" smtClean="0"/>
-              <a:t>/</a:t>
-            </a:r>
-            <a:r>
-              <a:rPr lang="en-US" dirty="0" err="1" smtClean="0"/>
-              <a:t>γ</a:t>
+              <a:t>ω/γ</a:t>
             </a:r>
             <a:endParaRPr lang="en-US" dirty="0"/>
           </a:p>
@@ -4224,11 +4196,11 @@
           <a:lstStyle/>
           <a:p>
             <a:r>
-              <a:rPr lang="en-US" dirty="0" err="1" smtClean="0"/>
+              <a:rPr lang="en-US" dirty="0" smtClean="0"/>
               <a:t>B</a:t>
             </a:r>
             <a:r>
-              <a:rPr lang="en-US" baseline="-25000" dirty="0" err="1" smtClean="0"/>
+              <a:rPr lang="en-US" baseline="-25000" dirty="0" smtClean="0"/>
               <a:t>eff</a:t>
             </a:r>
             <a:endParaRPr lang="en-US" baseline="-25000" dirty="0"/>
@@ -4395,7 +4367,7 @@
           <a:lstStyle/>
           <a:p>
             <a:pPr algn="ctr"/>
-            <a:endParaRPr lang="en-US"/>
+            <a:endParaRPr lang="en-US" dirty="0"/>
           </a:p>
         </p:txBody>
       </p:sp>

</xml_diff>